<commit_message>
Color Change (Blue → Green)
</commit_message>
<xml_diff>
--- a/Demonstration/Estée Lauder Hackathon 2019 – Project Presentation, ~3 Minutes.pptx
+++ b/Demonstration/Estée Lauder Hackathon 2019 – Project Presentation, ~3 Minutes.pptx
@@ -2,10 +2,12 @@
 <file path=ppt/presentation.xml><?xml version="1.0" encoding="utf-8"?>
 <p:presentation xmlns:a="http://schemas.openxmlformats.org/drawingml/2006/main" xmlns:r="http://schemas.openxmlformats.org/officeDocument/2006/relationships" xmlns:p="http://schemas.openxmlformats.org/presentationml/2006/main" autoCompressPictures="0">
   <p:sldMasterIdLst>
-    <p:sldMasterId id="2147483648" r:id="rId1"/>
+    <p:sldMasterId id="2147483975" r:id="rId1"/>
   </p:sldMasterIdLst>
   <p:sldIdLst>
     <p:sldId id="256" r:id="rId2"/>
+    <p:sldId id="257" r:id="rId3"/>
+    <p:sldId id="258" r:id="rId4"/>
   </p:sldIdLst>
   <p:sldSz cx="12192000" cy="6858000"/>
   <p:notesSz cx="6858000" cy="9144000"/>
@@ -104,6 +106,11 @@
       </a:defRPr>
     </a:lvl9pPr>
   </p:defaultTextStyle>
+  <p:extLst>
+    <p:ext uri="{EFAFB233-063F-42B5-8137-9DF3F51BA10A}">
+      <p15:sldGuideLst xmlns:p15="http://schemas.microsoft.com/office/powerpoint/2012/main"/>
+    </p:ext>
+  </p:extLst>
 </p:presentation>
 </file>
 
@@ -135,6 +142,13 @@
         <p:blipFill>
           <a:blip r:embed="rId2">
             <a:alphaModFix amt="30000"/>
+            <a:duotone>
+              <a:prstClr val="black"/>
+              <a:schemeClr val="tx2">
+                <a:tint val="45000"/>
+                <a:satMod val="400000"/>
+              </a:schemeClr>
+            </a:duotone>
             <a:extLst>
               <a:ext uri="{28A0092B-C50C-407E-A947-70E740481C1C}">
                 <a14:useLocalDpi xmlns:a14="http://schemas.microsoft.com/office/drawing/2010/main" val="0"/>
@@ -4382,7 +4396,7 @@
           <a:lstStyle/>
           <a:p>
             <a:fld id="{48A87A34-81AB-432B-8DAE-1953F412C126}" type="datetimeFigureOut">
-              <a:rPr lang="en-US" dirty="0"/>
+              <a:rPr lang="en-US" smtClean="0"/>
               <a:t>10/11/19</a:t>
             </a:fld>
             <a:endParaRPr lang="en-US" dirty="0"/>
@@ -4434,7 +4448,7 @@
           <a:lstStyle/>
           <a:p>
             <a:fld id="{6D22F896-40B5-4ADD-8801-0D06FADFA095}" type="slidenum">
-              <a:rPr lang="en-US" dirty="0"/>
+              <a:rPr lang="en-US" smtClean="0"/>
               <a:t>‹#›</a:t>
             </a:fld>
             <a:endParaRPr lang="en-US" dirty="0"/>
@@ -4442,6 +4456,11 @@
         </p:txBody>
       </p:sp>
     </p:spTree>
+    <p:extLst>
+      <p:ext uri="{BB962C8B-B14F-4D97-AF65-F5344CB8AC3E}">
+        <p14:creationId xmlns:p14="http://schemas.microsoft.com/office/powerpoint/2010/main" val="3181052258"/>
+      </p:ext>
+    </p:extLst>
   </p:cSld>
   <p:clrMapOvr>
     <a:masterClrMapping/>
@@ -4644,7 +4663,7 @@
           <a:lstStyle/>
           <a:p>
             <a:fld id="{48A87A34-81AB-432B-8DAE-1953F412C126}" type="datetimeFigureOut">
-              <a:rPr lang="en-US" dirty="0"/>
+              <a:rPr lang="en-US" smtClean="0"/>
               <a:t>10/11/19</a:t>
             </a:fld>
             <a:endParaRPr lang="en-US" dirty="0"/>
@@ -4686,7 +4705,7 @@
           <a:lstStyle/>
           <a:p>
             <a:fld id="{6D22F896-40B5-4ADD-8801-0D06FADFA095}" type="slidenum">
-              <a:rPr lang="en-US" dirty="0"/>
+              <a:rPr lang="en-US" smtClean="0"/>
               <a:t>‹#›</a:t>
             </a:fld>
             <a:endParaRPr lang="en-US" dirty="0"/>
@@ -4694,6 +4713,11 @@
         </p:txBody>
       </p:sp>
     </p:spTree>
+    <p:extLst>
+      <p:ext uri="{BB962C8B-B14F-4D97-AF65-F5344CB8AC3E}">
+        <p14:creationId xmlns:p14="http://schemas.microsoft.com/office/powerpoint/2010/main" val="4040078127"/>
+      </p:ext>
+    </p:extLst>
   </p:cSld>
   <p:clrMapOvr>
     <a:masterClrMapping/>
@@ -4835,7 +4859,7 @@
           <a:lstStyle/>
           <a:p>
             <a:fld id="{48A87A34-81AB-432B-8DAE-1953F412C126}" type="datetimeFigureOut">
-              <a:rPr lang="en-US" dirty="0"/>
+              <a:rPr lang="en-US" smtClean="0"/>
               <a:t>10/11/19</a:t>
             </a:fld>
             <a:endParaRPr lang="en-US" dirty="0"/>
@@ -4877,7 +4901,7 @@
           <a:lstStyle/>
           <a:p>
             <a:fld id="{6D22F896-40B5-4ADD-8801-0D06FADFA095}" type="slidenum">
-              <a:rPr lang="en-US" dirty="0"/>
+              <a:rPr lang="en-US" smtClean="0"/>
               <a:t>‹#›</a:t>
             </a:fld>
             <a:endParaRPr lang="en-US" dirty="0"/>
@@ -4885,6 +4909,11 @@
         </p:txBody>
       </p:sp>
     </p:spTree>
+    <p:extLst>
+      <p:ext uri="{BB962C8B-B14F-4D97-AF65-F5344CB8AC3E}">
+        <p14:creationId xmlns:p14="http://schemas.microsoft.com/office/powerpoint/2010/main" val="2456459905"/>
+      </p:ext>
+    </p:extLst>
   </p:cSld>
   <p:clrMapOvr>
     <a:masterClrMapping/>
@@ -5093,7 +5122,7 @@
           <a:lstStyle/>
           <a:p>
             <a:fld id="{48A87A34-81AB-432B-8DAE-1953F412C126}" type="datetimeFigureOut">
-              <a:rPr lang="en-US" dirty="0"/>
+              <a:rPr lang="en-US" smtClean="0"/>
               <a:t>10/11/19</a:t>
             </a:fld>
             <a:endParaRPr lang="en-US" dirty="0"/>
@@ -5135,7 +5164,7 @@
           <a:lstStyle/>
           <a:p>
             <a:fld id="{6D22F896-40B5-4ADD-8801-0D06FADFA095}" type="slidenum">
-              <a:rPr lang="en-US" dirty="0"/>
+              <a:rPr lang="en-US" smtClean="0"/>
               <a:t>‹#›</a:t>
             </a:fld>
             <a:endParaRPr lang="en-US" dirty="0"/>
@@ -5381,6 +5410,11 @@
         </p:txBody>
       </p:sp>
     </p:spTree>
+    <p:extLst>
+      <p:ext uri="{BB962C8B-B14F-4D97-AF65-F5344CB8AC3E}">
+        <p14:creationId xmlns:p14="http://schemas.microsoft.com/office/powerpoint/2010/main" val="294171800"/>
+      </p:ext>
+    </p:extLst>
   </p:cSld>
   <p:clrMapOvr>
     <a:masterClrMapping/>
@@ -5522,7 +5556,7 @@
           <a:lstStyle/>
           <a:p>
             <a:fld id="{48A87A34-81AB-432B-8DAE-1953F412C126}" type="datetimeFigureOut">
-              <a:rPr lang="en-US" dirty="0"/>
+              <a:rPr lang="en-US" smtClean="0"/>
               <a:t>10/11/19</a:t>
             </a:fld>
             <a:endParaRPr lang="en-US" dirty="0"/>
@@ -5564,7 +5598,7 @@
           <a:lstStyle/>
           <a:p>
             <a:fld id="{6D22F896-40B5-4ADD-8801-0D06FADFA095}" type="slidenum">
-              <a:rPr lang="en-US" dirty="0"/>
+              <a:rPr lang="en-US" smtClean="0"/>
               <a:t>‹#›</a:t>
             </a:fld>
             <a:endParaRPr lang="en-US" dirty="0"/>
@@ -5572,6 +5606,11 @@
         </p:txBody>
       </p:sp>
     </p:spTree>
+    <p:extLst>
+      <p:ext uri="{BB962C8B-B14F-4D97-AF65-F5344CB8AC3E}">
+        <p14:creationId xmlns:p14="http://schemas.microsoft.com/office/powerpoint/2010/main" val="2900542441"/>
+      </p:ext>
+    </p:extLst>
   </p:cSld>
   <p:clrMapOvr>
     <a:masterClrMapping/>
@@ -6063,7 +6102,7 @@
           <a:lstStyle/>
           <a:p>
             <a:fld id="{48A87A34-81AB-432B-8DAE-1953F412C126}" type="datetimeFigureOut">
-              <a:rPr lang="en-US" dirty="0"/>
+              <a:rPr lang="en-US" smtClean="0"/>
               <a:t>10/11/19</a:t>
             </a:fld>
             <a:endParaRPr lang="en-US" dirty="0"/>
@@ -6105,7 +6144,7 @@
           <a:lstStyle/>
           <a:p>
             <a:fld id="{6D22F896-40B5-4ADD-8801-0D06FADFA095}" type="slidenum">
-              <a:rPr lang="en-US" dirty="0"/>
+              <a:rPr lang="en-US" smtClean="0"/>
               <a:t>‹#›</a:t>
             </a:fld>
             <a:endParaRPr lang="en-US" dirty="0"/>
@@ -6113,6 +6152,11 @@
         </p:txBody>
       </p:sp>
     </p:spTree>
+    <p:extLst>
+      <p:ext uri="{BB962C8B-B14F-4D97-AF65-F5344CB8AC3E}">
+        <p14:creationId xmlns:p14="http://schemas.microsoft.com/office/powerpoint/2010/main" val="3895556885"/>
+      </p:ext>
+    </p:extLst>
   </p:cSld>
   <p:clrMapOvr>
     <a:masterClrMapping/>
@@ -6778,7 +6822,7 @@
           <a:lstStyle/>
           <a:p>
             <a:fld id="{48A87A34-81AB-432B-8DAE-1953F412C126}" type="datetimeFigureOut">
-              <a:rPr lang="en-US" dirty="0"/>
+              <a:rPr lang="en-US" smtClean="0"/>
               <a:t>10/11/19</a:t>
             </a:fld>
             <a:endParaRPr lang="en-US" dirty="0"/>
@@ -6820,7 +6864,7 @@
           <a:lstStyle/>
           <a:p>
             <a:fld id="{6D22F896-40B5-4ADD-8801-0D06FADFA095}" type="slidenum">
-              <a:rPr lang="en-US" dirty="0"/>
+              <a:rPr lang="en-US" smtClean="0"/>
               <a:t>‹#›</a:t>
             </a:fld>
             <a:endParaRPr lang="en-US" dirty="0"/>
@@ -6828,6 +6872,11 @@
         </p:txBody>
       </p:sp>
     </p:spTree>
+    <p:extLst>
+      <p:ext uri="{BB962C8B-B14F-4D97-AF65-F5344CB8AC3E}">
+        <p14:creationId xmlns:p14="http://schemas.microsoft.com/office/powerpoint/2010/main" val="1629491785"/>
+      </p:ext>
+    </p:extLst>
   </p:cSld>
   <p:clrMapOvr>
     <a:masterClrMapping/>
@@ -6943,7 +6992,7 @@
           <a:lstStyle/>
           <a:p>
             <a:fld id="{48A87A34-81AB-432B-8DAE-1953F412C126}" type="datetimeFigureOut">
-              <a:rPr lang="en-US" dirty="0"/>
+              <a:rPr lang="en-US" smtClean="0"/>
               <a:t>10/11/19</a:t>
             </a:fld>
             <a:endParaRPr lang="en-US" dirty="0"/>
@@ -6985,7 +7034,7 @@
           <a:lstStyle/>
           <a:p>
             <a:fld id="{6D22F896-40B5-4ADD-8801-0D06FADFA095}" type="slidenum">
-              <a:rPr lang="en-US" dirty="0"/>
+              <a:rPr lang="en-US" smtClean="0"/>
               <a:t>‹#›</a:t>
             </a:fld>
             <a:endParaRPr lang="en-US" dirty="0"/>
@@ -6993,6 +7042,11 @@
         </p:txBody>
       </p:sp>
     </p:spTree>
+    <p:extLst>
+      <p:ext uri="{BB962C8B-B14F-4D97-AF65-F5344CB8AC3E}">
+        <p14:creationId xmlns:p14="http://schemas.microsoft.com/office/powerpoint/2010/main" val="119899282"/>
+      </p:ext>
+    </p:extLst>
   </p:cSld>
   <p:clrMapOvr>
     <a:masterClrMapping/>
@@ -7118,7 +7172,7 @@
           <a:lstStyle/>
           <a:p>
             <a:fld id="{48A87A34-81AB-432B-8DAE-1953F412C126}" type="datetimeFigureOut">
-              <a:rPr lang="en-US" dirty="0"/>
+              <a:rPr lang="en-US" smtClean="0"/>
               <a:t>10/11/19</a:t>
             </a:fld>
             <a:endParaRPr lang="en-US" dirty="0"/>
@@ -7160,7 +7214,7 @@
           <a:lstStyle/>
           <a:p>
             <a:fld id="{6D22F896-40B5-4ADD-8801-0D06FADFA095}" type="slidenum">
-              <a:rPr lang="en-US" dirty="0"/>
+              <a:rPr lang="en-US" smtClean="0"/>
               <a:t>‹#›</a:t>
             </a:fld>
             <a:endParaRPr lang="en-US" dirty="0"/>
@@ -7168,6 +7222,11 @@
         </p:txBody>
       </p:sp>
     </p:spTree>
+    <p:extLst>
+      <p:ext uri="{BB962C8B-B14F-4D97-AF65-F5344CB8AC3E}">
+        <p14:creationId xmlns:p14="http://schemas.microsoft.com/office/powerpoint/2010/main" val="1179520999"/>
+      </p:ext>
+    </p:extLst>
   </p:cSld>
   <p:clrMapOvr>
     <a:masterClrMapping/>
@@ -7283,7 +7342,7 @@
           <a:lstStyle/>
           <a:p>
             <a:fld id="{48A87A34-81AB-432B-8DAE-1953F412C126}" type="datetimeFigureOut">
-              <a:rPr lang="en-US" dirty="0"/>
+              <a:rPr lang="en-US" smtClean="0"/>
               <a:t>10/11/19</a:t>
             </a:fld>
             <a:endParaRPr lang="en-US" dirty="0"/>
@@ -7325,7 +7384,7 @@
           <a:lstStyle/>
           <a:p>
             <a:fld id="{6D22F896-40B5-4ADD-8801-0D06FADFA095}" type="slidenum">
-              <a:rPr lang="en-US" dirty="0"/>
+              <a:rPr lang="en-US" smtClean="0"/>
               <a:t>‹#›</a:t>
             </a:fld>
             <a:endParaRPr lang="en-US" dirty="0"/>
@@ -7333,6 +7392,11 @@
         </p:txBody>
       </p:sp>
     </p:spTree>
+    <p:extLst>
+      <p:ext uri="{BB962C8B-B14F-4D97-AF65-F5344CB8AC3E}">
+        <p14:creationId xmlns:p14="http://schemas.microsoft.com/office/powerpoint/2010/main" val="348366677"/>
+      </p:ext>
+    </p:extLst>
   </p:cSld>
   <p:clrMapOvr>
     <a:masterClrMapping/>
@@ -7528,7 +7592,7 @@
           <a:lstStyle/>
           <a:p>
             <a:fld id="{48A87A34-81AB-432B-8DAE-1953F412C126}" type="datetimeFigureOut">
-              <a:rPr lang="en-US" dirty="0"/>
+              <a:rPr lang="en-US" smtClean="0"/>
               <a:t>10/11/19</a:t>
             </a:fld>
             <a:endParaRPr lang="en-US" dirty="0"/>
@@ -7570,7 +7634,7 @@
           <a:lstStyle/>
           <a:p>
             <a:fld id="{6D22F896-40B5-4ADD-8801-0D06FADFA095}" type="slidenum">
-              <a:rPr lang="en-US" dirty="0"/>
+              <a:rPr lang="en-US" smtClean="0"/>
               <a:t>‹#›</a:t>
             </a:fld>
             <a:endParaRPr lang="en-US" dirty="0"/>
@@ -7578,6 +7642,11 @@
         </p:txBody>
       </p:sp>
     </p:spTree>
+    <p:extLst>
+      <p:ext uri="{BB962C8B-B14F-4D97-AF65-F5344CB8AC3E}">
+        <p14:creationId xmlns:p14="http://schemas.microsoft.com/office/powerpoint/2010/main" val="1407494864"/>
+      </p:ext>
+    </p:extLst>
   </p:cSld>
   <p:clrMapOvr>
     <a:masterClrMapping/>
@@ -7755,7 +7824,7 @@
           <a:lstStyle/>
           <a:p>
             <a:fld id="{48A87A34-81AB-432B-8DAE-1953F412C126}" type="datetimeFigureOut">
-              <a:rPr lang="en-US" dirty="0"/>
+              <a:rPr lang="en-US" smtClean="0"/>
               <a:t>10/11/19</a:t>
             </a:fld>
             <a:endParaRPr lang="en-US" dirty="0"/>
@@ -7797,7 +7866,7 @@
           <a:lstStyle/>
           <a:p>
             <a:fld id="{6D22F896-40B5-4ADD-8801-0D06FADFA095}" type="slidenum">
-              <a:rPr lang="en-US" dirty="0"/>
+              <a:rPr lang="en-US" smtClean="0"/>
               <a:t>‹#›</a:t>
             </a:fld>
             <a:endParaRPr lang="en-US" dirty="0"/>
@@ -7805,6 +7874,11 @@
         </p:txBody>
       </p:sp>
     </p:spTree>
+    <p:extLst>
+      <p:ext uri="{BB962C8B-B14F-4D97-AF65-F5344CB8AC3E}">
+        <p14:creationId xmlns:p14="http://schemas.microsoft.com/office/powerpoint/2010/main" val="775033892"/>
+      </p:ext>
+    </p:extLst>
   </p:cSld>
   <p:clrMapOvr>
     <a:masterClrMapping/>
@@ -8131,7 +8205,7 @@
           <a:lstStyle/>
           <a:p>
             <a:fld id="{48A87A34-81AB-432B-8DAE-1953F412C126}" type="datetimeFigureOut">
-              <a:rPr lang="en-US" dirty="0"/>
+              <a:rPr lang="en-US" smtClean="0"/>
               <a:t>10/11/19</a:t>
             </a:fld>
             <a:endParaRPr lang="en-US" dirty="0"/>
@@ -8173,7 +8247,7 @@
           <a:lstStyle/>
           <a:p>
             <a:fld id="{6D22F896-40B5-4ADD-8801-0D06FADFA095}" type="slidenum">
-              <a:rPr lang="en-US" dirty="0"/>
+              <a:rPr lang="en-US" smtClean="0"/>
               <a:t>‹#›</a:t>
             </a:fld>
             <a:endParaRPr lang="en-US" dirty="0"/>
@@ -8181,6 +8255,11 @@
         </p:txBody>
       </p:sp>
     </p:spTree>
+    <p:extLst>
+      <p:ext uri="{BB962C8B-B14F-4D97-AF65-F5344CB8AC3E}">
+        <p14:creationId xmlns:p14="http://schemas.microsoft.com/office/powerpoint/2010/main" val="811797520"/>
+      </p:ext>
+    </p:extLst>
   </p:cSld>
   <p:clrMapOvr>
     <a:masterClrMapping/>
@@ -8244,7 +8323,7 @@
           <a:lstStyle/>
           <a:p>
             <a:fld id="{48A87A34-81AB-432B-8DAE-1953F412C126}" type="datetimeFigureOut">
-              <a:rPr lang="en-US" dirty="0"/>
+              <a:rPr lang="en-US" smtClean="0"/>
               <a:t>10/11/19</a:t>
             </a:fld>
             <a:endParaRPr lang="en-US" dirty="0"/>
@@ -8286,7 +8365,7 @@
           <a:lstStyle/>
           <a:p>
             <a:fld id="{6D22F896-40B5-4ADD-8801-0D06FADFA095}" type="slidenum">
-              <a:rPr lang="en-US" dirty="0"/>
+              <a:rPr lang="en-US" smtClean="0"/>
               <a:t>‹#›</a:t>
             </a:fld>
             <a:endParaRPr lang="en-US" dirty="0"/>
@@ -8294,6 +8373,11 @@
         </p:txBody>
       </p:sp>
     </p:spTree>
+    <p:extLst>
+      <p:ext uri="{BB962C8B-B14F-4D97-AF65-F5344CB8AC3E}">
+        <p14:creationId xmlns:p14="http://schemas.microsoft.com/office/powerpoint/2010/main" val="2018534523"/>
+      </p:ext>
+    </p:extLst>
   </p:cSld>
   <p:clrMapOvr>
     <a:masterClrMapping/>
@@ -8334,7 +8418,7 @@
           <a:lstStyle/>
           <a:p>
             <a:fld id="{48A87A34-81AB-432B-8DAE-1953F412C126}" type="datetimeFigureOut">
-              <a:rPr lang="en-US" dirty="0"/>
+              <a:rPr lang="en-US" smtClean="0"/>
               <a:t>10/11/19</a:t>
             </a:fld>
             <a:endParaRPr lang="en-US" dirty="0"/>
@@ -8376,7 +8460,7 @@
           <a:lstStyle/>
           <a:p>
             <a:fld id="{6D22F896-40B5-4ADD-8801-0D06FADFA095}" type="slidenum">
-              <a:rPr lang="en-US" dirty="0"/>
+              <a:rPr lang="en-US" smtClean="0"/>
               <a:t>‹#›</a:t>
             </a:fld>
             <a:endParaRPr lang="en-US" dirty="0"/>
@@ -8384,6 +8468,11 @@
         </p:txBody>
       </p:sp>
     </p:spTree>
+    <p:extLst>
+      <p:ext uri="{BB962C8B-B14F-4D97-AF65-F5344CB8AC3E}">
+        <p14:creationId xmlns:p14="http://schemas.microsoft.com/office/powerpoint/2010/main" val="2643271744"/>
+      </p:ext>
+    </p:extLst>
   </p:cSld>
   <p:clrMapOvr>
     <a:masterClrMapping/>
@@ -8578,7 +8667,7 @@
           <a:lstStyle/>
           <a:p>
             <a:fld id="{48A87A34-81AB-432B-8DAE-1953F412C126}" type="datetimeFigureOut">
-              <a:rPr lang="en-US" dirty="0"/>
+              <a:rPr lang="en-US" smtClean="0"/>
               <a:t>10/11/19</a:t>
             </a:fld>
             <a:endParaRPr lang="en-US" dirty="0"/>
@@ -8620,7 +8709,7 @@
           <a:lstStyle/>
           <a:p>
             <a:fld id="{6D22F896-40B5-4ADD-8801-0D06FADFA095}" type="slidenum">
-              <a:rPr lang="en-US" dirty="0"/>
+              <a:rPr lang="en-US" smtClean="0"/>
               <a:t>‹#›</a:t>
             </a:fld>
             <a:endParaRPr lang="en-US" dirty="0"/>
@@ -8628,6 +8717,11 @@
         </p:txBody>
       </p:sp>
     </p:spTree>
+    <p:extLst>
+      <p:ext uri="{BB962C8B-B14F-4D97-AF65-F5344CB8AC3E}">
+        <p14:creationId xmlns:p14="http://schemas.microsoft.com/office/powerpoint/2010/main" val="3598620157"/>
+      </p:ext>
+    </p:extLst>
   </p:cSld>
   <p:clrMapOvr>
     <a:masterClrMapping/>
@@ -8853,7 +8947,7 @@
           <a:lstStyle/>
           <a:p>
             <a:fld id="{48A87A34-81AB-432B-8DAE-1953F412C126}" type="datetimeFigureOut">
-              <a:rPr lang="en-US" dirty="0"/>
+              <a:rPr lang="en-US" smtClean="0"/>
               <a:t>10/11/19</a:t>
             </a:fld>
             <a:endParaRPr lang="en-US" dirty="0"/>
@@ -8895,7 +8989,7 @@
           <a:lstStyle/>
           <a:p>
             <a:fld id="{6D22F896-40B5-4ADD-8801-0D06FADFA095}" type="slidenum">
-              <a:rPr lang="en-US" dirty="0"/>
+              <a:rPr lang="en-US" smtClean="0"/>
               <a:t>‹#›</a:t>
             </a:fld>
             <a:endParaRPr lang="en-US" dirty="0"/>
@@ -8903,6 +8997,11 @@
         </p:txBody>
       </p:sp>
     </p:spTree>
+    <p:extLst>
+      <p:ext uri="{BB962C8B-B14F-4D97-AF65-F5344CB8AC3E}">
+        <p14:creationId xmlns:p14="http://schemas.microsoft.com/office/powerpoint/2010/main" val="3938402859"/>
+      </p:ext>
+    </p:extLst>
   </p:cSld>
   <p:clrMapOvr>
     <a:masterClrMapping/>
@@ -8943,6 +9042,13 @@
         <p:blipFill>
           <a:blip r:embed="rId19">
             <a:alphaModFix amt="30000"/>
+            <a:duotone>
+              <a:prstClr val="black"/>
+              <a:schemeClr val="tx2">
+                <a:tint val="45000"/>
+                <a:satMod val="400000"/>
+              </a:schemeClr>
+            </a:duotone>
             <a:extLst>
               <a:ext uri="{28A0092B-C50C-407E-A947-70E740481C1C}">
                 <a14:useLocalDpi xmlns:a14="http://schemas.microsoft.com/office/drawing/2010/main" val="0"/>
@@ -11925,7 +12031,7 @@
           </a:lstStyle>
           <a:p>
             <a:fld id="{48A87A34-81AB-432B-8DAE-1953F412C126}" type="datetimeFigureOut">
-              <a:rPr lang="en-US" dirty="0"/>
+              <a:rPr lang="en-US" smtClean="0"/>
               <a:pPr/>
               <a:t>10/11/19</a:t>
             </a:fld>
@@ -12004,7 +12110,7 @@
           </a:lstStyle>
           <a:p>
             <a:fld id="{6D22F896-40B5-4ADD-8801-0D06FADFA095}" type="slidenum">
-              <a:rPr lang="en-US" dirty="0"/>
+              <a:rPr lang="en-US" smtClean="0"/>
               <a:pPr/>
               <a:t>‹#›</a:t>
             </a:fld>
@@ -12013,26 +12119,31 @@
         </p:txBody>
       </p:sp>
     </p:spTree>
+    <p:extLst>
+      <p:ext uri="{BB962C8B-B14F-4D97-AF65-F5344CB8AC3E}">
+        <p14:creationId xmlns:p14="http://schemas.microsoft.com/office/powerpoint/2010/main" val="2094179563"/>
+      </p:ext>
+    </p:extLst>
   </p:cSld>
   <p:clrMap bg1="dk1" tx1="lt1" bg2="dk2" tx2="lt2" accent1="accent1" accent2="accent2" accent3="accent3" accent4="accent4" accent5="accent5" accent6="accent6" hlink="hlink" folHlink="folHlink"/>
   <p:sldLayoutIdLst>
-    <p:sldLayoutId id="2147483649" r:id="rId1"/>
-    <p:sldLayoutId id="2147483650" r:id="rId2"/>
-    <p:sldLayoutId id="2147483651" r:id="rId3"/>
-    <p:sldLayoutId id="2147483652" r:id="rId4"/>
-    <p:sldLayoutId id="2147483653" r:id="rId5"/>
-    <p:sldLayoutId id="2147483654" r:id="rId6"/>
-    <p:sldLayoutId id="2147483655" r:id="rId7"/>
-    <p:sldLayoutId id="2147483656" r:id="rId8"/>
-    <p:sldLayoutId id="2147483657" r:id="rId9"/>
-    <p:sldLayoutId id="2147483660" r:id="rId10"/>
-    <p:sldLayoutId id="2147483661" r:id="rId11"/>
-    <p:sldLayoutId id="2147483666" r:id="rId12"/>
-    <p:sldLayoutId id="2147483663" r:id="rId13"/>
-    <p:sldLayoutId id="2147483667" r:id="rId14"/>
-    <p:sldLayoutId id="2147483668" r:id="rId15"/>
-    <p:sldLayoutId id="2147483658" r:id="rId16"/>
-    <p:sldLayoutId id="2147483659" r:id="rId17"/>
+    <p:sldLayoutId id="2147483976" r:id="rId1"/>
+    <p:sldLayoutId id="2147483977" r:id="rId2"/>
+    <p:sldLayoutId id="2147483978" r:id="rId3"/>
+    <p:sldLayoutId id="2147483979" r:id="rId4"/>
+    <p:sldLayoutId id="2147483980" r:id="rId5"/>
+    <p:sldLayoutId id="2147483981" r:id="rId6"/>
+    <p:sldLayoutId id="2147483982" r:id="rId7"/>
+    <p:sldLayoutId id="2147483983" r:id="rId8"/>
+    <p:sldLayoutId id="2147483984" r:id="rId9"/>
+    <p:sldLayoutId id="2147483985" r:id="rId10"/>
+    <p:sldLayoutId id="2147483986" r:id="rId11"/>
+    <p:sldLayoutId id="2147483987" r:id="rId12"/>
+    <p:sldLayoutId id="2147483988" r:id="rId13"/>
+    <p:sldLayoutId id="2147483989" r:id="rId14"/>
+    <p:sldLayoutId id="2147483990" r:id="rId15"/>
+    <p:sldLayoutId id="2147483991" r:id="rId16"/>
+    <p:sldLayoutId id="2147483992" r:id="rId17"/>
   </p:sldLayoutIdLst>
   <p:txStyles>
     <p:titleStyle>
@@ -12048,6 +12159,13 @@
           <a:solidFill>
             <a:schemeClr val="tx1"/>
           </a:solidFill>
+          <a:effectLst>
+            <a:outerShdw blurRad="177800" dist="38100" dir="2700000" algn="tl">
+              <a:srgbClr val="000000">
+                <a:alpha val="24000"/>
+              </a:srgbClr>
+            </a:outerShdw>
+          </a:effectLst>
           <a:latin typeface="+mj-lt"/>
           <a:ea typeface="+mj-ea"/>
           <a:cs typeface="+mj-cs"/>
@@ -12069,6 +12187,13 @@
           <a:solidFill>
             <a:schemeClr val="tx1"/>
           </a:solidFill>
+          <a:effectLst>
+            <a:outerShdw blurRad="152400" dist="38100" dir="2700000" algn="tl">
+              <a:srgbClr val="000000">
+                <a:alpha val="36000"/>
+              </a:srgbClr>
+            </a:outerShdw>
+          </a:effectLst>
           <a:latin typeface="+mn-lt"/>
           <a:ea typeface="+mn-ea"/>
           <a:cs typeface="+mn-cs"/>
@@ -12088,6 +12213,13 @@
           <a:solidFill>
             <a:schemeClr val="tx1"/>
           </a:solidFill>
+          <a:effectLst>
+            <a:outerShdw blurRad="152400" dist="38100" dir="2700000" algn="tl">
+              <a:srgbClr val="000000">
+                <a:alpha val="36000"/>
+              </a:srgbClr>
+            </a:outerShdw>
+          </a:effectLst>
           <a:latin typeface="+mn-lt"/>
           <a:ea typeface="+mn-ea"/>
           <a:cs typeface="+mn-cs"/>
@@ -12107,6 +12239,13 @@
           <a:solidFill>
             <a:schemeClr val="tx1"/>
           </a:solidFill>
+          <a:effectLst>
+            <a:outerShdw blurRad="152400" dist="38100" dir="2700000" algn="tl">
+              <a:srgbClr val="000000">
+                <a:alpha val="36000"/>
+              </a:srgbClr>
+            </a:outerShdw>
+          </a:effectLst>
           <a:latin typeface="+mn-lt"/>
           <a:ea typeface="+mn-ea"/>
           <a:cs typeface="+mn-cs"/>
@@ -12126,6 +12265,13 @@
           <a:solidFill>
             <a:schemeClr val="tx1"/>
           </a:solidFill>
+          <a:effectLst>
+            <a:outerShdw blurRad="152400" dist="38100" dir="2700000" algn="tl">
+              <a:srgbClr val="000000">
+                <a:alpha val="36000"/>
+              </a:srgbClr>
+            </a:outerShdw>
+          </a:effectLst>
           <a:latin typeface="+mn-lt"/>
           <a:ea typeface="+mn-ea"/>
           <a:cs typeface="+mn-cs"/>
@@ -12145,6 +12291,13 @@
           <a:solidFill>
             <a:schemeClr val="tx1"/>
           </a:solidFill>
+          <a:effectLst>
+            <a:outerShdw blurRad="152400" dist="38100" dir="2700000" algn="tl">
+              <a:srgbClr val="000000">
+                <a:alpha val="36000"/>
+              </a:srgbClr>
+            </a:outerShdw>
+          </a:effectLst>
           <a:latin typeface="+mn-lt"/>
           <a:ea typeface="+mn-ea"/>
           <a:cs typeface="+mn-cs"/>
@@ -12446,6 +12599,169 @@
 </p:sld>
 </file>
 
+<file path=ppt/slides/slide2.xml><?xml version="1.0" encoding="utf-8"?>
+<p:sld xmlns:a="http://schemas.openxmlformats.org/drawingml/2006/main" xmlns:r="http://schemas.openxmlformats.org/officeDocument/2006/relationships" xmlns:p="http://schemas.openxmlformats.org/presentationml/2006/main">
+  <p:cSld>
+    <p:spTree>
+      <p:nvGrpSpPr>
+        <p:cNvPr id="1" name=""/>
+        <p:cNvGrpSpPr/>
+        <p:nvPr/>
+      </p:nvGrpSpPr>
+      <p:grpSpPr>
+        <a:xfrm>
+          <a:off x="0" y="0"/>
+          <a:ext cx="0" cy="0"/>
+          <a:chOff x="0" y="0"/>
+          <a:chExt cx="0" cy="0"/>
+        </a:xfrm>
+      </p:grpSpPr>
+      <p:sp>
+        <p:nvSpPr>
+          <p:cNvPr id="2" name="Title 1">
+            <a:extLst>
+              <a:ext uri="{FF2B5EF4-FFF2-40B4-BE49-F238E27FC236}">
+                <a16:creationId xmlns:a16="http://schemas.microsoft.com/office/drawing/2014/main" id="{2DA77ECA-A09A-C644-A35B-4F2D59675052}"/>
+              </a:ext>
+            </a:extLst>
+          </p:cNvPr>
+          <p:cNvSpPr>
+            <a:spLocks noGrp="1"/>
+          </p:cNvSpPr>
+          <p:nvPr>
+            <p:ph type="title"/>
+          </p:nvPr>
+        </p:nvSpPr>
+        <p:spPr/>
+        <p:txBody>
+          <a:bodyPr/>
+          <a:lstStyle/>
+          <a:p>
+            <a:r>
+              <a:rPr lang="en-US" dirty="0"/>
+              <a:t>Objective</a:t>
+            </a:r>
+          </a:p>
+        </p:txBody>
+      </p:sp>
+      <p:sp>
+        <p:nvSpPr>
+          <p:cNvPr id="3" name="Content Placeholder 2">
+            <a:extLst>
+              <a:ext uri="{FF2B5EF4-FFF2-40B4-BE49-F238E27FC236}">
+                <a16:creationId xmlns:a16="http://schemas.microsoft.com/office/drawing/2014/main" id="{F6D38825-335A-A54B-A6C4-39E39EB602F7}"/>
+              </a:ext>
+            </a:extLst>
+          </p:cNvPr>
+          <p:cNvSpPr>
+            <a:spLocks noGrp="1"/>
+          </p:cNvSpPr>
+          <p:nvPr>
+            <p:ph idx="1"/>
+          </p:nvPr>
+        </p:nvSpPr>
+        <p:spPr/>
+        <p:txBody>
+          <a:bodyPr/>
+          <a:lstStyle/>
+          <a:p>
+            <a:endParaRPr lang="en-US"/>
+          </a:p>
+        </p:txBody>
+      </p:sp>
+    </p:spTree>
+    <p:extLst>
+      <p:ext uri="{BB962C8B-B14F-4D97-AF65-F5344CB8AC3E}">
+        <p14:creationId xmlns:p14="http://schemas.microsoft.com/office/powerpoint/2010/main" val="1450376071"/>
+      </p:ext>
+    </p:extLst>
+  </p:cSld>
+  <p:clrMapOvr>
+    <a:masterClrMapping/>
+  </p:clrMapOvr>
+</p:sld>
+</file>
+
+<file path=ppt/slides/slide3.xml><?xml version="1.0" encoding="utf-8"?>
+<p:sld xmlns:a="http://schemas.openxmlformats.org/drawingml/2006/main" xmlns:r="http://schemas.openxmlformats.org/officeDocument/2006/relationships" xmlns:p="http://schemas.openxmlformats.org/presentationml/2006/main">
+  <p:cSld>
+    <p:spTree>
+      <p:nvGrpSpPr>
+        <p:cNvPr id="1" name=""/>
+        <p:cNvGrpSpPr/>
+        <p:nvPr/>
+      </p:nvGrpSpPr>
+      <p:grpSpPr>
+        <a:xfrm>
+          <a:off x="0" y="0"/>
+          <a:ext cx="0" cy="0"/>
+          <a:chOff x="0" y="0"/>
+          <a:chExt cx="0" cy="0"/>
+        </a:xfrm>
+      </p:grpSpPr>
+      <p:sp>
+        <p:nvSpPr>
+          <p:cNvPr id="2" name="Title 1">
+            <a:extLst>
+              <a:ext uri="{FF2B5EF4-FFF2-40B4-BE49-F238E27FC236}">
+                <a16:creationId xmlns:a16="http://schemas.microsoft.com/office/drawing/2014/main" id="{23A5AF61-FB94-A246-A754-E0764A43456A}"/>
+              </a:ext>
+            </a:extLst>
+          </p:cNvPr>
+          <p:cNvSpPr>
+            <a:spLocks noGrp="1"/>
+          </p:cNvSpPr>
+          <p:nvPr>
+            <p:ph type="title"/>
+          </p:nvPr>
+        </p:nvSpPr>
+        <p:spPr/>
+        <p:txBody>
+          <a:bodyPr/>
+          <a:lstStyle/>
+          <a:p>
+            <a:endParaRPr lang="en-US"/>
+          </a:p>
+        </p:txBody>
+      </p:sp>
+      <p:sp>
+        <p:nvSpPr>
+          <p:cNvPr id="3" name="Content Placeholder 2">
+            <a:extLst>
+              <a:ext uri="{FF2B5EF4-FFF2-40B4-BE49-F238E27FC236}">
+                <a16:creationId xmlns:a16="http://schemas.microsoft.com/office/drawing/2014/main" id="{C308B348-167E-764B-BE97-E563F68723AC}"/>
+              </a:ext>
+            </a:extLst>
+          </p:cNvPr>
+          <p:cNvSpPr>
+            <a:spLocks noGrp="1"/>
+          </p:cNvSpPr>
+          <p:nvPr>
+            <p:ph idx="1"/>
+          </p:nvPr>
+        </p:nvSpPr>
+        <p:spPr/>
+        <p:txBody>
+          <a:bodyPr/>
+          <a:lstStyle/>
+          <a:p>
+            <a:endParaRPr lang="en-US"/>
+          </a:p>
+        </p:txBody>
+      </p:sp>
+    </p:spTree>
+    <p:extLst>
+      <p:ext uri="{BB962C8B-B14F-4D97-AF65-F5344CB8AC3E}">
+        <p14:creationId xmlns:p14="http://schemas.microsoft.com/office/powerpoint/2010/main" val="3273662769"/>
+      </p:ext>
+    </p:extLst>
+  </p:cSld>
+  <p:clrMapOvr>
+    <a:masterClrMapping/>
+  </p:clrMapOvr>
+</p:sld>
+</file>
+
 <file path=ppt/theme/theme1.xml><?xml version="1.0" encoding="utf-8"?>
 <a:theme xmlns:a="http://schemas.openxmlformats.org/drawingml/2006/main" name="Circuit">
   <a:themeElements>
@@ -12457,34 +12773,34 @@
         <a:sysClr val="window" lastClr="FFFFFF"/>
       </a:lt1>
       <a:dk2>
-        <a:srgbClr val="134770"/>
+        <a:srgbClr val="2B5F27"/>
       </a:dk2>
       <a:lt2>
-        <a:srgbClr val="82FFFF"/>
+        <a:srgbClr val="D8FC68"/>
       </a:lt2>
       <a:accent1>
-        <a:srgbClr val="9ACD4C"/>
+        <a:srgbClr val="DDC855"/>
       </a:accent1>
       <a:accent2>
-        <a:srgbClr val="FAA93A"/>
+        <a:srgbClr val="FCA03D"/>
       </a:accent2>
       <a:accent3>
-        <a:srgbClr val="D35940"/>
+        <a:srgbClr val="E36439"/>
       </a:accent3>
       <a:accent4>
-        <a:srgbClr val="B258D3"/>
+        <a:srgbClr val="C2935B"/>
       </a:accent4>
       <a:accent5>
-        <a:srgbClr val="63A0CC"/>
+        <a:srgbClr val="88C25C"/>
       </a:accent5>
       <a:accent6>
-        <a:srgbClr val="8AC4A7"/>
+        <a:srgbClr val="BFCC86"/>
       </a:accent6>
       <a:hlink>
-        <a:srgbClr val="B8FA56"/>
+        <a:srgbClr val="FFCE23"/>
       </a:hlink>
       <a:folHlink>
-        <a:srgbClr val="7AF8CC"/>
+        <a:srgbClr val="FDEB86"/>
       </a:folHlink>
     </a:clrScheme>
     <a:fontScheme name="Circuit">
@@ -12649,7 +12965,7 @@
             <a:gs pos="0">
               <a:schemeClr val="phClr">
                 <a:tint val="98000"/>
-                <a:hueMod val="94000"/>
+                <a:hueMod val="88000"/>
                 <a:satMod val="148000"/>
                 <a:lumMod val="150000"/>
               </a:schemeClr>
@@ -12676,7 +12992,7 @@
               </a:schemeClr>
               <a:schemeClr val="phClr">
                 <a:tint val="98000"/>
-                <a:hueMod val="90000"/>
+                <a:hueMod val="82000"/>
                 <a:satMod val="150000"/>
                 <a:lumMod val="160000"/>
               </a:schemeClr>
@@ -12691,7 +13007,7 @@
   <a:extraClrSchemeLst/>
   <a:extLst>
     <a:ext uri="{05A4C25C-085E-4340-85A3-A5531E510DB2}">
-      <thm15:themeFamily xmlns:thm15="http://schemas.microsoft.com/office/thememl/2012/main" name="Circuit" id="{0AC2F7E7-15F5-431C-B2A2-456FE929F56C}" vid="{0911B802-464C-4241-8DD9-B60FF88E379F}"/>
+      <thm15:themeFamily xmlns:thm15="http://schemas.microsoft.com/office/thememl/2012/main" name="Circuit" id="{0AC2F7E7-15F5-431C-B2A2-456FE929F56C}" vid="{97ECCC31-8429-4523-BE8D-8F09B7A4D46D}"/>
     </a:ext>
   </a:extLst>
 </a:theme>

</xml_diff>

<commit_message>
Project Presentation (~3 Minutes)
</commit_message>
<xml_diff>
--- a/Demonstration/Estée Lauder Hackathon 2019 – Project Presentation, ~3 Minutes.pptx
+++ b/Demonstration/Estée Lauder Hackathon 2019 – Project Presentation, ~3 Minutes.pptx
@@ -4397,7 +4397,7 @@
           <a:p>
             <a:fld id="{48A87A34-81AB-432B-8DAE-1953F412C126}" type="datetimeFigureOut">
               <a:rPr lang="en-US" smtClean="0"/>
-              <a:t>10/11/19</a:t>
+              <a:t>10/12/2019</a:t>
             </a:fld>
             <a:endParaRPr lang="en-US" dirty="0"/>
           </a:p>
@@ -4664,7 +4664,7 @@
           <a:p>
             <a:fld id="{48A87A34-81AB-432B-8DAE-1953F412C126}" type="datetimeFigureOut">
               <a:rPr lang="en-US" smtClean="0"/>
-              <a:t>10/11/19</a:t>
+              <a:t>10/12/2019</a:t>
             </a:fld>
             <a:endParaRPr lang="en-US" dirty="0"/>
           </a:p>
@@ -4860,7 +4860,7 @@
           <a:p>
             <a:fld id="{48A87A34-81AB-432B-8DAE-1953F412C126}" type="datetimeFigureOut">
               <a:rPr lang="en-US" smtClean="0"/>
-              <a:t>10/11/19</a:t>
+              <a:t>10/12/2019</a:t>
             </a:fld>
             <a:endParaRPr lang="en-US" dirty="0"/>
           </a:p>
@@ -5123,7 +5123,7 @@
           <a:p>
             <a:fld id="{48A87A34-81AB-432B-8DAE-1953F412C126}" type="datetimeFigureOut">
               <a:rPr lang="en-US" smtClean="0"/>
-              <a:t>10/11/19</a:t>
+              <a:t>10/12/2019</a:t>
             </a:fld>
             <a:endParaRPr lang="en-US" dirty="0"/>
           </a:p>
@@ -5557,7 +5557,7 @@
           <a:p>
             <a:fld id="{48A87A34-81AB-432B-8DAE-1953F412C126}" type="datetimeFigureOut">
               <a:rPr lang="en-US" smtClean="0"/>
-              <a:t>10/11/19</a:t>
+              <a:t>10/12/2019</a:t>
             </a:fld>
             <a:endParaRPr lang="en-US" dirty="0"/>
           </a:p>
@@ -6103,7 +6103,7 @@
           <a:p>
             <a:fld id="{48A87A34-81AB-432B-8DAE-1953F412C126}" type="datetimeFigureOut">
               <a:rPr lang="en-US" smtClean="0"/>
-              <a:t>10/11/19</a:t>
+              <a:t>10/12/2019</a:t>
             </a:fld>
             <a:endParaRPr lang="en-US" dirty="0"/>
           </a:p>
@@ -6823,7 +6823,7 @@
           <a:p>
             <a:fld id="{48A87A34-81AB-432B-8DAE-1953F412C126}" type="datetimeFigureOut">
               <a:rPr lang="en-US" smtClean="0"/>
-              <a:t>10/11/19</a:t>
+              <a:t>10/12/2019</a:t>
             </a:fld>
             <a:endParaRPr lang="en-US" dirty="0"/>
           </a:p>
@@ -6993,7 +6993,7 @@
           <a:p>
             <a:fld id="{48A87A34-81AB-432B-8DAE-1953F412C126}" type="datetimeFigureOut">
               <a:rPr lang="en-US" smtClean="0"/>
-              <a:t>10/11/19</a:t>
+              <a:t>10/12/2019</a:t>
             </a:fld>
             <a:endParaRPr lang="en-US" dirty="0"/>
           </a:p>
@@ -7173,7 +7173,7 @@
           <a:p>
             <a:fld id="{48A87A34-81AB-432B-8DAE-1953F412C126}" type="datetimeFigureOut">
               <a:rPr lang="en-US" smtClean="0"/>
-              <a:t>10/11/19</a:t>
+              <a:t>10/12/2019</a:t>
             </a:fld>
             <a:endParaRPr lang="en-US" dirty="0"/>
           </a:p>
@@ -7343,7 +7343,7 @@
           <a:p>
             <a:fld id="{48A87A34-81AB-432B-8DAE-1953F412C126}" type="datetimeFigureOut">
               <a:rPr lang="en-US" smtClean="0"/>
-              <a:t>10/11/19</a:t>
+              <a:t>10/12/2019</a:t>
             </a:fld>
             <a:endParaRPr lang="en-US" dirty="0"/>
           </a:p>
@@ -7593,7 +7593,7 @@
           <a:p>
             <a:fld id="{48A87A34-81AB-432B-8DAE-1953F412C126}" type="datetimeFigureOut">
               <a:rPr lang="en-US" smtClean="0"/>
-              <a:t>10/11/19</a:t>
+              <a:t>10/12/2019</a:t>
             </a:fld>
             <a:endParaRPr lang="en-US" dirty="0"/>
           </a:p>
@@ -7825,7 +7825,7 @@
           <a:p>
             <a:fld id="{48A87A34-81AB-432B-8DAE-1953F412C126}" type="datetimeFigureOut">
               <a:rPr lang="en-US" smtClean="0"/>
-              <a:t>10/11/19</a:t>
+              <a:t>10/12/2019</a:t>
             </a:fld>
             <a:endParaRPr lang="en-US" dirty="0"/>
           </a:p>
@@ -8206,7 +8206,7 @@
           <a:p>
             <a:fld id="{48A87A34-81AB-432B-8DAE-1953F412C126}" type="datetimeFigureOut">
               <a:rPr lang="en-US" smtClean="0"/>
-              <a:t>10/11/19</a:t>
+              <a:t>10/12/2019</a:t>
             </a:fld>
             <a:endParaRPr lang="en-US" dirty="0"/>
           </a:p>
@@ -8324,7 +8324,7 @@
           <a:p>
             <a:fld id="{48A87A34-81AB-432B-8DAE-1953F412C126}" type="datetimeFigureOut">
               <a:rPr lang="en-US" smtClean="0"/>
-              <a:t>10/11/19</a:t>
+              <a:t>10/12/2019</a:t>
             </a:fld>
             <a:endParaRPr lang="en-US" dirty="0"/>
           </a:p>
@@ -8419,7 +8419,7 @@
           <a:p>
             <a:fld id="{48A87A34-81AB-432B-8DAE-1953F412C126}" type="datetimeFigureOut">
               <a:rPr lang="en-US" smtClean="0"/>
-              <a:t>10/11/19</a:t>
+              <a:t>10/12/2019</a:t>
             </a:fld>
             <a:endParaRPr lang="en-US" dirty="0"/>
           </a:p>
@@ -8668,7 +8668,7 @@
           <a:p>
             <a:fld id="{48A87A34-81AB-432B-8DAE-1953F412C126}" type="datetimeFigureOut">
               <a:rPr lang="en-US" smtClean="0"/>
-              <a:t>10/11/19</a:t>
+              <a:t>10/12/2019</a:t>
             </a:fld>
             <a:endParaRPr lang="en-US" dirty="0"/>
           </a:p>
@@ -8948,7 +8948,7 @@
           <a:p>
             <a:fld id="{48A87A34-81AB-432B-8DAE-1953F412C126}" type="datetimeFigureOut">
               <a:rPr lang="en-US" smtClean="0"/>
-              <a:t>10/11/19</a:t>
+              <a:t>10/12/2019</a:t>
             </a:fld>
             <a:endParaRPr lang="en-US" dirty="0"/>
           </a:p>
@@ -12033,7 +12033,7 @@
             <a:fld id="{48A87A34-81AB-432B-8DAE-1953F412C126}" type="datetimeFigureOut">
               <a:rPr lang="en-US" smtClean="0"/>
               <a:pPr/>
-              <a:t>10/11/19</a:t>
+              <a:t>10/12/2019</a:t>
             </a:fld>
             <a:endParaRPr lang="en-US" dirty="0"/>
           </a:p>
@@ -12517,7 +12517,10 @@
           <a:bodyPr/>
           <a:lstStyle/>
           <a:p>
-            <a:endParaRPr lang="en-US" dirty="0"/>
+            <a:r>
+              <a:rPr lang="en-US" dirty="0"/>
+              <a:t>Clarity</a:t>
+            </a:r>
           </a:p>
         </p:txBody>
       </p:sp>
@@ -12639,7 +12642,7 @@
           <a:p>
             <a:r>
               <a:rPr lang="en-US" dirty="0"/>
-              <a:t>Objective</a:t>
+              <a:t>Clarity was born</a:t>
             </a:r>
           </a:p>
         </p:txBody>
@@ -12665,7 +12668,52 @@
           <a:bodyPr/>
           <a:lstStyle/>
           <a:p>
-            <a:endParaRPr lang="en-US"/>
+            <a:r>
+              <a:rPr lang="en-US" dirty="0"/>
+              <a:t>Inspiration:</a:t>
+            </a:r>
+          </a:p>
+          <a:p>
+            <a:pPr lvl="1"/>
+            <a:r>
+              <a:rPr lang="en-US" dirty="0"/>
+              <a:t>The power of education</a:t>
+            </a:r>
+          </a:p>
+          <a:p>
+            <a:pPr lvl="1"/>
+            <a:r>
+              <a:rPr lang="en-US" dirty="0"/>
+              <a:t>Increasingly high interest for safe ingredients</a:t>
+            </a:r>
+          </a:p>
+          <a:p>
+            <a:pPr lvl="1"/>
+            <a:r>
+              <a:rPr lang="en-US" dirty="0"/>
+              <a:t>Demand for skincare and makeup products</a:t>
+            </a:r>
+          </a:p>
+          <a:p>
+            <a:r>
+              <a:rPr lang="en-US" dirty="0"/>
+              <a:t>Enhance natural beauty</a:t>
+            </a:r>
+          </a:p>
+          <a:p>
+            <a:r>
+              <a:rPr lang="en-US" dirty="0"/>
+              <a:t>Natural ingredients</a:t>
+            </a:r>
+          </a:p>
+          <a:p>
+            <a:r>
+              <a:rPr lang="en-US" dirty="0"/>
+              <a:t>Ingredient Transparency</a:t>
+            </a:r>
+          </a:p>
+          <a:p>
+            <a:endParaRPr lang="en-US" dirty="0"/>
           </a:p>
         </p:txBody>
       </p:sp>
@@ -12701,10 +12749,10 @@
       </p:grpSpPr>
       <p:sp>
         <p:nvSpPr>
-          <p:cNvPr id="2" name="Title 1">
+          <p:cNvPr id="6" name="Title 5">
             <a:extLst>
               <a:ext uri="{FF2B5EF4-FFF2-40B4-BE49-F238E27FC236}">
-                <a16:creationId xmlns:a16="http://schemas.microsoft.com/office/drawing/2014/main" id="{23A5AF61-FB94-A246-A754-E0764A43456A}"/>
+                <a16:creationId xmlns:a16="http://schemas.microsoft.com/office/drawing/2014/main" id="{C344DB87-1E25-3F4A-9AE4-223E3AD9988A}"/>
               </a:ext>
             </a:extLst>
           </p:cNvPr>
@@ -12717,19 +12765,25 @@
         </p:nvSpPr>
         <p:spPr/>
         <p:txBody>
-          <a:bodyPr/>
+          <a:bodyPr>
+            <a:normAutofit/>
+          </a:bodyPr>
           <a:lstStyle/>
           <a:p>
-            <a:endParaRPr lang="en-US"/>
+            <a:pPr algn="ctr"/>
+            <a:r>
+              <a:rPr lang="en-US" sz="11500" dirty="0"/>
+              <a:t>Demo</a:t>
+            </a:r>
           </a:p>
         </p:txBody>
       </p:sp>
       <p:sp>
         <p:nvSpPr>
-          <p:cNvPr id="3" name="Content Placeholder 2">
+          <p:cNvPr id="7" name="Text Placeholder 6">
             <a:extLst>
               <a:ext uri="{FF2B5EF4-FFF2-40B4-BE49-F238E27FC236}">
-                <a16:creationId xmlns:a16="http://schemas.microsoft.com/office/drawing/2014/main" id="{C308B348-167E-764B-BE97-E563F68723AC}"/>
+                <a16:creationId xmlns:a16="http://schemas.microsoft.com/office/drawing/2014/main" id="{7A2CFB5C-3BDA-7046-8407-E7E7526AA0C6}"/>
               </a:ext>
             </a:extLst>
           </p:cNvPr>
@@ -12737,7 +12791,7 @@
             <a:spLocks noGrp="1"/>
           </p:cNvSpPr>
           <p:nvPr>
-            <p:ph idx="1"/>
+            <p:ph type="body" idx="1"/>
           </p:nvPr>
         </p:nvSpPr>
         <p:spPr/>

</xml_diff>